<commit_message>
Added the updated use case diagram.
</commit_message>
<xml_diff>
--- a/Micro Services.pptx
+++ b/Micro Services.pptx
@@ -10,7 +10,8 @@
     <p:sldId id="257" r:id="rId4"/>
     <p:sldId id="266" r:id="rId5"/>
     <p:sldId id="268" r:id="rId6"/>
-    <p:sldId id="275" r:id="rId7"/>
+    <p:sldId id="276" r:id="rId7"/>
+    <p:sldId id="275" r:id="rId8"/>
   </p:sldIdLst>
   <p:sldSz cx="12192000" cy="6858000"/>
   <p:notesSz cx="6858000" cy="9144000"/>
@@ -264,7 +265,7 @@
           <a:p>
             <a:fld id="{31DE9594-35EC-4A0C-8E77-1E70B8256F72}" type="datetimeFigureOut">
               <a:rPr lang="en-US" smtClean="0"/>
-              <a:t>02/21/20</a:t>
+              <a:t>03/10/20</a:t>
             </a:fld>
             <a:endParaRPr lang="en-US"/>
           </a:p>
@@ -462,7 +463,7 @@
           <a:p>
             <a:fld id="{31DE9594-35EC-4A0C-8E77-1E70B8256F72}" type="datetimeFigureOut">
               <a:rPr lang="en-US" smtClean="0"/>
-              <a:t>02/21/20</a:t>
+              <a:t>03/10/20</a:t>
             </a:fld>
             <a:endParaRPr lang="en-US"/>
           </a:p>
@@ -670,7 +671,7 @@
           <a:p>
             <a:fld id="{31DE9594-35EC-4A0C-8E77-1E70B8256F72}" type="datetimeFigureOut">
               <a:rPr lang="en-US" smtClean="0"/>
-              <a:t>02/21/20</a:t>
+              <a:t>03/10/20</a:t>
             </a:fld>
             <a:endParaRPr lang="en-US"/>
           </a:p>
@@ -868,7 +869,7 @@
           <a:p>
             <a:fld id="{31DE9594-35EC-4A0C-8E77-1E70B8256F72}" type="datetimeFigureOut">
               <a:rPr lang="en-US" smtClean="0"/>
-              <a:t>02/21/20</a:t>
+              <a:t>03/10/20</a:t>
             </a:fld>
             <a:endParaRPr lang="en-US"/>
           </a:p>
@@ -1143,7 +1144,7 @@
           <a:p>
             <a:fld id="{31DE9594-35EC-4A0C-8E77-1E70B8256F72}" type="datetimeFigureOut">
               <a:rPr lang="en-US" smtClean="0"/>
-              <a:t>02/21/20</a:t>
+              <a:t>03/10/20</a:t>
             </a:fld>
             <a:endParaRPr lang="en-US"/>
           </a:p>
@@ -1408,7 +1409,7 @@
           <a:p>
             <a:fld id="{31DE9594-35EC-4A0C-8E77-1E70B8256F72}" type="datetimeFigureOut">
               <a:rPr lang="en-US" smtClean="0"/>
-              <a:t>02/21/20</a:t>
+              <a:t>03/10/20</a:t>
             </a:fld>
             <a:endParaRPr lang="en-US"/>
           </a:p>
@@ -1820,7 +1821,7 @@
           <a:p>
             <a:fld id="{31DE9594-35EC-4A0C-8E77-1E70B8256F72}" type="datetimeFigureOut">
               <a:rPr lang="en-US" smtClean="0"/>
-              <a:t>02/21/20</a:t>
+              <a:t>03/10/20</a:t>
             </a:fld>
             <a:endParaRPr lang="en-US"/>
           </a:p>
@@ -1961,7 +1962,7 @@
           <a:p>
             <a:fld id="{31DE9594-35EC-4A0C-8E77-1E70B8256F72}" type="datetimeFigureOut">
               <a:rPr lang="en-US" smtClean="0"/>
-              <a:t>02/21/20</a:t>
+              <a:t>03/10/20</a:t>
             </a:fld>
             <a:endParaRPr lang="en-US"/>
           </a:p>
@@ -2074,7 +2075,7 @@
           <a:p>
             <a:fld id="{31DE9594-35EC-4A0C-8E77-1E70B8256F72}" type="datetimeFigureOut">
               <a:rPr lang="en-US" smtClean="0"/>
-              <a:t>02/21/20</a:t>
+              <a:t>03/10/20</a:t>
             </a:fld>
             <a:endParaRPr lang="en-US"/>
           </a:p>
@@ -2385,7 +2386,7 @@
           <a:p>
             <a:fld id="{31DE9594-35EC-4A0C-8E77-1E70B8256F72}" type="datetimeFigureOut">
               <a:rPr lang="en-US" smtClean="0"/>
-              <a:t>02/21/20</a:t>
+              <a:t>03/10/20</a:t>
             </a:fld>
             <a:endParaRPr lang="en-US"/>
           </a:p>
@@ -2673,7 +2674,7 @@
           <a:p>
             <a:fld id="{31DE9594-35EC-4A0C-8E77-1E70B8256F72}" type="datetimeFigureOut">
               <a:rPr lang="en-US" smtClean="0"/>
-              <a:t>02/21/20</a:t>
+              <a:t>03/10/20</a:t>
             </a:fld>
             <a:endParaRPr lang="en-US"/>
           </a:p>
@@ -2914,7 +2915,7 @@
           <a:p>
             <a:fld id="{31DE9594-35EC-4A0C-8E77-1E70B8256F72}" type="datetimeFigureOut">
               <a:rPr lang="en-US" smtClean="0"/>
-              <a:t>02/21/20</a:t>
+              <a:t>03/10/20</a:t>
             </a:fld>
             <a:endParaRPr lang="en-US"/>
           </a:p>
@@ -4604,7 +4605,7 @@
         <p:spPr/>
         <p:txBody>
           <a:bodyPr>
-            <a:normAutofit fontScale="77500" lnSpcReduction="20000"/>
+            <a:normAutofit fontScale="85000" lnSpcReduction="20000"/>
           </a:bodyPr>
           <a:lstStyle/>
           <a:p>
@@ -4617,60 +4618,89 @@
             </a:r>
           </a:p>
           <a:p>
+            <a:pPr marL="0" indent="0">
+              <a:buNone/>
+            </a:pPr>
+            <a:endParaRPr lang="en-US" b="1" dirty="0"/>
+          </a:p>
+          <a:p>
+            <a:pPr lvl="0"/>
             <a:r>
               <a:rPr lang="en-US" dirty="0"/>
-              <a:t>To allow the consumer to search for a mobile phone using his/her budget.</a:t>
-            </a:r>
-          </a:p>
-          <a:p>
+              <a:t>To allow the consumer to search for a mobile phone; using </a:t>
+            </a:r>
+            <a:r>
+              <a:rPr lang="en-US" i="1" dirty="0"/>
+              <a:t>smartphone price</a:t>
+            </a:r>
             <a:r>
               <a:rPr lang="en-US" dirty="0"/>
-              <a:t>To provide the consumer with the best smartphone for the budget.</a:t>
-            </a:r>
-          </a:p>
-          <a:p>
+              <a:t> </a:t>
+            </a:r>
+            <a:r>
+              <a:rPr lang="en-US" b="1" dirty="0"/>
+              <a:t>or</a:t>
+            </a:r>
+            <a:r>
+              <a:rPr lang="en-US" dirty="0"/>
+              <a:t> </a:t>
+            </a:r>
+            <a:r>
+              <a:rPr lang="en-US" i="1" dirty="0"/>
+              <a:t>smartphone brand</a:t>
+            </a:r>
+            <a:r>
+              <a:rPr lang="en-US" dirty="0"/>
+              <a:t> </a:t>
+            </a:r>
+            <a:r>
+              <a:rPr lang="en-US" b="1" dirty="0"/>
+              <a:t>or</a:t>
+            </a:r>
+            <a:r>
+              <a:rPr lang="en-US" dirty="0"/>
+              <a:t> </a:t>
+            </a:r>
+            <a:r>
+              <a:rPr lang="en-US" i="1" dirty="0"/>
+              <a:t>smartphone name</a:t>
+            </a:r>
+            <a:r>
+              <a:rPr lang="en-US" dirty="0"/>
+              <a:t>.</a:t>
+            </a:r>
+          </a:p>
+          <a:p>
+            <a:pPr lvl="0"/>
+            <a:endParaRPr lang="en-US" dirty="0"/>
+          </a:p>
+          <a:p>
+            <a:pPr lvl="0"/>
             <a:r>
               <a:rPr lang="en-US" dirty="0"/>
               <a:t>To allow the consumer to identify the main aspects to look for when buying a smartphone.</a:t>
             </a:r>
           </a:p>
           <a:p>
+            <a:pPr lvl="0"/>
+            <a:endParaRPr lang="en-US" dirty="0"/>
+          </a:p>
+          <a:p>
+            <a:pPr lvl="0"/>
             <a:r>
               <a:rPr lang="en-US" dirty="0"/>
               <a:t>To allow consumers to view details of a specific mobile phone.</a:t>
             </a:r>
           </a:p>
           <a:p>
+            <a:pPr lvl="0"/>
+            <a:endParaRPr lang="en-US" dirty="0"/>
+          </a:p>
+          <a:p>
+            <a:pPr lvl="0"/>
             <a:r>
               <a:rPr lang="en-US" dirty="0"/>
               <a:t>To allow the consumer to view the smartphones categorized according to brand names and latest smartphones.</a:t>
-            </a:r>
-          </a:p>
-          <a:p>
-            <a:pPr marL="0" indent="0">
-              <a:buNone/>
-            </a:pPr>
-            <a:endParaRPr lang="en-US" dirty="0"/>
-          </a:p>
-          <a:p>
-            <a:pPr marL="0" indent="0">
-              <a:buNone/>
-            </a:pPr>
-            <a:r>
-              <a:rPr lang="en-US" b="1" dirty="0"/>
-              <a:t>Non-functional</a:t>
-            </a:r>
-          </a:p>
-          <a:p>
-            <a:r>
-              <a:rPr lang="en-US" dirty="0"/>
-              <a:t>To be responsive for a greater user-experience.</a:t>
-            </a:r>
-          </a:p>
-          <a:p>
-            <a:r>
-              <a:rPr lang="en-US" dirty="0"/>
-              <a:t>To be user-friendly for the average consumer (free of complicated UI components).</a:t>
             </a:r>
           </a:p>
         </p:txBody>
@@ -4924,7 +4954,7 @@
           <a:bodyPr/>
           <a:lstStyle/>
           <a:p>
-            <a:endParaRPr lang="en-US"/>
+            <a:endParaRPr lang="en-US" dirty="0"/>
           </a:p>
         </p:txBody>
       </p:sp>
@@ -4942,6 +4972,295 @@
 </file>
 
 <file path=ppt/slides/slide6.xml><?xml version="1.0" encoding="utf-8"?>
+<p:sld xmlns:a="http://schemas.openxmlformats.org/drawingml/2006/main" xmlns:r="http://schemas.openxmlformats.org/officeDocument/2006/relationships" xmlns:p="http://schemas.openxmlformats.org/presentationml/2006/main">
+  <p:cSld>
+    <p:bg>
+      <p:bgPr>
+        <a:solidFill>
+          <a:schemeClr val="tx2">
+            <a:lumMod val="40000"/>
+            <a:lumOff val="60000"/>
+          </a:schemeClr>
+        </a:solidFill>
+        <a:effectLst/>
+      </p:bgPr>
+    </p:bg>
+    <p:spTree>
+      <p:nvGrpSpPr>
+        <p:cNvPr id="1" name=""/>
+        <p:cNvGrpSpPr/>
+        <p:nvPr/>
+      </p:nvGrpSpPr>
+      <p:grpSpPr>
+        <a:xfrm>
+          <a:off x="0" y="0"/>
+          <a:ext cx="0" cy="0"/>
+          <a:chOff x="0" y="0"/>
+          <a:chExt cx="0" cy="0"/>
+        </a:xfrm>
+      </p:grpSpPr>
+      <p:sp>
+        <p:nvSpPr>
+          <p:cNvPr id="18" name="Rectangle 9">
+            <a:extLst>
+              <a:ext uri="{FF2B5EF4-FFF2-40B4-BE49-F238E27FC236}">
+                <a16:creationId xmlns:a16="http://schemas.microsoft.com/office/drawing/2014/main" id="{6753252F-4873-4F63-801D-CC719279A7D5}"/>
+              </a:ext>
+              <a:ext uri="{C183D7F6-B498-43B3-948B-1728B52AA6E4}">
+                <adec:decorative xmlns:adec="http://schemas.microsoft.com/office/drawing/2017/decorative" val="1"/>
+              </a:ext>
+            </a:extLst>
+          </p:cNvPr>
+          <p:cNvSpPr>
+            <a:spLocks noGrp="1" noRot="1" noChangeAspect="1" noMove="1" noResize="1" noEditPoints="1" noAdjustHandles="1" noChangeArrowheads="1" noChangeShapeType="1" noTextEdit="1"/>
+          </p:cNvSpPr>
+          <p:nvPr>
+            <p:extLst>
+              <p:ext uri="{386F3935-93C4-4BCD-93E2-E3B085C9AB24}">
+                <p16:designElem xmlns:p16="http://schemas.microsoft.com/office/powerpoint/2015/main" val="1"/>
+              </p:ext>
+            </p:extLst>
+          </p:nvPr>
+        </p:nvSpPr>
+        <p:spPr>
+          <a:xfrm>
+            <a:off x="0" y="0"/>
+            <a:ext cx="12192000" cy="6858000"/>
+          </a:xfrm>
+          <a:prstGeom prst="rect">
+            <a:avLst/>
+          </a:prstGeom>
+          <a:solidFill>
+            <a:srgbClr val="FFFFFF"/>
+          </a:solidFill>
+          <a:ln>
+            <a:noFill/>
+          </a:ln>
+        </p:spPr>
+        <p:style>
+          <a:lnRef idx="2">
+            <a:schemeClr val="accent1">
+              <a:shade val="50000"/>
+            </a:schemeClr>
+          </a:lnRef>
+          <a:fillRef idx="1">
+            <a:schemeClr val="accent1"/>
+          </a:fillRef>
+          <a:effectRef idx="0">
+            <a:schemeClr val="accent1"/>
+          </a:effectRef>
+          <a:fontRef idx="minor">
+            <a:schemeClr val="lt1"/>
+          </a:fontRef>
+        </p:style>
+        <p:txBody>
+          <a:bodyPr rtlCol="0" anchor="ctr"/>
+          <a:lstStyle/>
+          <a:p>
+            <a:pPr algn="ctr"/>
+            <a:endParaRPr lang="en-US"/>
+          </a:p>
+        </p:txBody>
+      </p:sp>
+      <p:sp>
+        <p:nvSpPr>
+          <p:cNvPr id="12" name="Rectangle 11">
+            <a:extLst>
+              <a:ext uri="{FF2B5EF4-FFF2-40B4-BE49-F238E27FC236}">
+                <a16:creationId xmlns:a16="http://schemas.microsoft.com/office/drawing/2014/main" id="{047C8CCB-F95D-4249-92DD-651249D3535A}"/>
+              </a:ext>
+              <a:ext uri="{C183D7F6-B498-43B3-948B-1728B52AA6E4}">
+                <adec:decorative xmlns:adec="http://schemas.microsoft.com/office/drawing/2017/decorative" val="1"/>
+              </a:ext>
+            </a:extLst>
+          </p:cNvPr>
+          <p:cNvSpPr>
+            <a:spLocks noGrp="1" noRot="1" noChangeAspect="1" noMove="1" noResize="1" noEditPoints="1" noAdjustHandles="1" noChangeArrowheads="1" noChangeShapeType="1" noTextEdit="1"/>
+          </p:cNvSpPr>
+          <p:nvPr>
+            <p:extLst>
+              <p:ext uri="{386F3935-93C4-4BCD-93E2-E3B085C9AB24}">
+                <p16:designElem xmlns:p16="http://schemas.microsoft.com/office/powerpoint/2015/main" val="1"/>
+              </p:ext>
+            </p:extLst>
+          </p:nvPr>
+        </p:nvSpPr>
+        <p:spPr>
+          <a:xfrm>
+            <a:off x="0" y="0"/>
+            <a:ext cx="2013557" cy="6858000"/>
+          </a:xfrm>
+          <a:prstGeom prst="rect">
+            <a:avLst/>
+          </a:prstGeom>
+          <a:solidFill>
+            <a:srgbClr val="7F7F7F"/>
+          </a:solidFill>
+          <a:ln>
+            <a:noFill/>
+          </a:ln>
+        </p:spPr>
+        <p:style>
+          <a:lnRef idx="2">
+            <a:schemeClr val="accent1">
+              <a:shade val="50000"/>
+            </a:schemeClr>
+          </a:lnRef>
+          <a:fillRef idx="1">
+            <a:schemeClr val="accent1"/>
+          </a:fillRef>
+          <a:effectRef idx="0">
+            <a:schemeClr val="accent1"/>
+          </a:effectRef>
+          <a:fontRef idx="minor">
+            <a:schemeClr val="lt1"/>
+          </a:fontRef>
+        </p:style>
+        <p:txBody>
+          <a:bodyPr rtlCol="0" anchor="ctr"/>
+          <a:lstStyle/>
+          <a:p>
+            <a:pPr algn="ctr"/>
+            <a:endParaRPr lang="en-US"/>
+          </a:p>
+        </p:txBody>
+      </p:sp>
+      <p:sp>
+        <p:nvSpPr>
+          <p:cNvPr id="2" name="Title 1">
+            <a:extLst>
+              <a:ext uri="{FF2B5EF4-FFF2-40B4-BE49-F238E27FC236}">
+                <a16:creationId xmlns:a16="http://schemas.microsoft.com/office/drawing/2014/main" id="{2BF5194F-B499-4A4C-945D-E9C5FD6AF231}"/>
+              </a:ext>
+            </a:extLst>
+          </p:cNvPr>
+          <p:cNvSpPr>
+            <a:spLocks noGrp="1"/>
+          </p:cNvSpPr>
+          <p:nvPr>
+            <p:ph type="title"/>
+          </p:nvPr>
+        </p:nvSpPr>
+        <p:spPr>
+          <a:xfrm>
+            <a:off x="640080" y="2074363"/>
+            <a:ext cx="2752354" cy="2709275"/>
+          </a:xfrm>
+          <a:prstGeom prst="ellipse">
+            <a:avLst/>
+          </a:prstGeom>
+          <a:solidFill>
+            <a:srgbClr val="262626"/>
+          </a:solidFill>
+          <a:ln w="174625" cmpd="thinThick">
+            <a:solidFill>
+              <a:srgbClr val="262626"/>
+            </a:solidFill>
+          </a:ln>
+        </p:spPr>
+        <p:txBody>
+          <a:bodyPr vert="horz" lIns="91440" tIns="45720" rIns="91440" bIns="45720" rtlCol="0" anchor="ctr">
+            <a:normAutofit/>
+          </a:bodyPr>
+          <a:lstStyle/>
+          <a:p>
+            <a:pPr algn="ctr"/>
+            <a:r>
+              <a:rPr lang="en-US" sz="2600" b="1" dirty="0">
+                <a:solidFill>
+                  <a:srgbClr val="FFFFFF"/>
+                </a:solidFill>
+                <a:effectLst>
+                  <a:outerShdw blurRad="50800" dist="38100" dir="8100000" algn="tr" rotWithShape="0">
+                    <a:prstClr val="black">
+                      <a:alpha val="40000"/>
+                    </a:prstClr>
+                  </a:outerShdw>
+                </a:effectLst>
+              </a:rPr>
+              <a:t>THE</a:t>
+            </a:r>
+            <a:br>
+              <a:rPr lang="en-US" sz="2600" b="1" dirty="0">
+                <a:solidFill>
+                  <a:srgbClr val="FFFFFF"/>
+                </a:solidFill>
+                <a:effectLst>
+                  <a:outerShdw blurRad="50800" dist="38100" dir="8100000" algn="tr" rotWithShape="0">
+                    <a:prstClr val="black">
+                      <a:alpha val="40000"/>
+                    </a:prstClr>
+                  </a:outerShdw>
+                </a:effectLst>
+              </a:rPr>
+            </a:br>
+            <a:r>
+              <a:rPr lang="en-US" sz="2600" b="1" kern="1200" dirty="0">
+                <a:solidFill>
+                  <a:srgbClr val="FFFFFF"/>
+                </a:solidFill>
+                <a:effectLst>
+                  <a:outerShdw blurRad="50800" dist="38100" dir="8100000" algn="tr" rotWithShape="0">
+                    <a:prstClr val="black">
+                      <a:alpha val="40000"/>
+                    </a:prstClr>
+                  </a:outerShdw>
+                </a:effectLst>
+                <a:latin typeface="+mj-lt"/>
+                <a:ea typeface="+mj-ea"/>
+                <a:cs typeface="+mj-cs"/>
+              </a:rPr>
+              <a:t>USE-CASE DIAGRAM</a:t>
+            </a:r>
+          </a:p>
+        </p:txBody>
+      </p:sp>
+      <p:pic>
+        <p:nvPicPr>
+          <p:cNvPr id="3" name="Content Placeholder 2">
+            <a:extLst>
+              <a:ext uri="{FF2B5EF4-FFF2-40B4-BE49-F238E27FC236}">
+                <a16:creationId xmlns:a16="http://schemas.microsoft.com/office/drawing/2014/main" id="{A67A91DA-B412-47E2-8E6D-0440C9767ED0}"/>
+              </a:ext>
+            </a:extLst>
+          </p:cNvPr>
+          <p:cNvPicPr>
+            <a:picLocks noGrp="1" noChangeAspect="1"/>
+          </p:cNvPicPr>
+          <p:nvPr>
+            <p:ph idx="1"/>
+          </p:nvPr>
+        </p:nvPicPr>
+        <p:blipFill>
+          <a:blip r:embed="rId2"/>
+          <a:stretch>
+            <a:fillRect/>
+          </a:stretch>
+        </p:blipFill>
+        <p:spPr>
+          <a:xfrm>
+            <a:off x="3392434" y="649755"/>
+            <a:ext cx="8573143" cy="5558489"/>
+          </a:xfrm>
+          <a:prstGeom prst="rect">
+            <a:avLst/>
+          </a:prstGeom>
+        </p:spPr>
+      </p:pic>
+    </p:spTree>
+    <p:extLst>
+      <p:ext uri="{BB962C8B-B14F-4D97-AF65-F5344CB8AC3E}">
+        <p14:creationId xmlns:p14="http://schemas.microsoft.com/office/powerpoint/2010/main" val="3532779155"/>
+      </p:ext>
+    </p:extLst>
+  </p:cSld>
+  <p:clrMapOvr>
+    <a:masterClrMapping/>
+  </p:clrMapOvr>
+</p:sld>
+</file>
+
+<file path=ppt/slides/slide7.xml><?xml version="1.0" encoding="utf-8"?>
 <p:sld xmlns:a="http://schemas.openxmlformats.org/drawingml/2006/main" xmlns:r="http://schemas.openxmlformats.org/officeDocument/2006/relationships" xmlns:p="http://schemas.openxmlformats.org/presentationml/2006/main">
   <p:cSld>
     <p:bg>

</xml_diff>